<commit_message>
updated project presentation 2
</commit_message>
<xml_diff>
--- a/ITEC-876  GroupE_MajorProject#2.pptx
+++ b/ITEC-876  GroupE_MajorProject#2.pptx
@@ -4882,35 +4882,6 @@
           </a:p>
         </p:txBody>
       </p:sp>
-      <p:pic>
-        <p:nvPicPr>
-          <p:cNvPr id="5" name="Content Placeholder 4" descr="A picture containing meter, drawing&#10;&#10;Description automatically generated">
-            <a:extLst>
-              <a:ext uri="{FF2B5EF4-FFF2-40B4-BE49-F238E27FC236}">
-                <a16:creationId xmlns:a16="http://schemas.microsoft.com/office/drawing/2014/main" id="{8174C03F-9544-40EC-B314-C3787A04AAD3}"/>
-              </a:ext>
-            </a:extLst>
-          </p:cNvPr>
-          <p:cNvPicPr>
-            <a:picLocks noGrp="1" noChangeAspect="1"/>
-          </p:cNvPicPr>
-          <p:nvPr>
-            <p:ph idx="1"/>
-          </p:nvPr>
-        </p:nvPicPr>
-        <p:blipFill>
-          <a:blip r:embed="rId2"/>
-          <a:stretch>
-            <a:fillRect/>
-          </a:stretch>
-        </p:blipFill>
-        <p:spPr>
-          <a:xfrm>
-            <a:off x="1868688" y="4588642"/>
-            <a:ext cx="8413830" cy="1067686"/>
-          </a:xfrm>
-        </p:spPr>
-      </p:pic>
       <p:sp>
         <p:nvSpPr>
           <p:cNvPr id="11" name="Content Placeholder 2">
@@ -5422,7 +5393,7 @@
             </a:r>
             <a:r>
               <a:rPr lang="en-US" dirty="0"/>
-              <a:t> shows Precision which is equal to 28.4%. That means the model has 28.4% of correct predicted labels. Here </a:t>
+              <a:t> shows Precision which is equal to 28.7%. That means the model has 28.7% of correct predicted labels. Here </a:t>
             </a:r>
             <a:r>
               <a:rPr lang="en-US" dirty="0">
@@ -5473,7 +5444,7 @@
             </a:r>
             <a:r>
               <a:rPr lang="en-US" dirty="0"/>
-              <a:t> shows Recall which is equal to ~9.5%. That means 9.5% of labels are successfully predicted. Here </a:t>
+              <a:t> shows Recall which is equal to 9.6%. That means 9.6% of labels are successfully predicted. Here </a:t>
             </a:r>
             <a:r>
               <a:rPr lang="en-US" dirty="0">
@@ -5542,6 +5513,36 @@
           </a:p>
         </p:txBody>
       </p:sp>
+      <p:pic>
+        <p:nvPicPr>
+          <p:cNvPr id="7" name="Picture 6">
+            <a:extLst>
+              <a:ext uri="{FF2B5EF4-FFF2-40B4-BE49-F238E27FC236}">
+                <a16:creationId xmlns:a16="http://schemas.microsoft.com/office/drawing/2014/main" id="{86435D89-0CE7-4590-85DA-0B22D37A3E96}"/>
+              </a:ext>
+            </a:extLst>
+          </p:cNvPr>
+          <p:cNvPicPr>
+            <a:picLocks noChangeAspect="1"/>
+          </p:cNvPicPr>
+          <p:nvPr/>
+        </p:nvPicPr>
+        <p:blipFill>
+          <a:blip r:embed="rId2"/>
+          <a:stretch>
+            <a:fillRect/>
+          </a:stretch>
+        </p:blipFill>
+        <p:spPr>
+          <a:xfrm>
+            <a:off x="1889085" y="4542173"/>
+            <a:ext cx="8413830" cy="1048879"/>
+          </a:xfrm>
+          <a:prstGeom prst="rect">
+            <a:avLst/>
+          </a:prstGeom>
+        </p:spPr>
+      </p:pic>
     </p:spTree>
     <p:extLst>
       <p:ext uri="{BB962C8B-B14F-4D97-AF65-F5344CB8AC3E}">
@@ -6677,7 +6678,7 @@
             </a:r>
             <a:r>
               <a:rPr lang="en-US" sz="2000" dirty="0"/>
-              <a:t> shows Precision which is equal to ~36%.  8% more Precision than Model I.</a:t>
+              <a:t> shows Precision which is equal to 36.6%.  8% more Precision than Model I.</a:t>
             </a:r>
             <a:endParaRPr lang="en-AU" sz="2000" dirty="0"/>
           </a:p>
@@ -6695,7 +6696,7 @@
             </a:r>
             <a:r>
               <a:rPr lang="en-US" sz="2000" dirty="0"/>
-              <a:t> shows Recall which is equal to 12%. 3% more Recall than Model I.</a:t>
+              <a:t> shows Recall which is equal to 12.2%. 3% more Recall than Model I.</a:t>
             </a:r>
             <a:endParaRPr lang="en-AU" sz="2000" dirty="0"/>
           </a:p>
@@ -6703,19 +6704,17 @@
       </p:sp>
       <p:pic>
         <p:nvPicPr>
-          <p:cNvPr id="6" name="Content Placeholder 5">
+          <p:cNvPr id="3" name="Picture 2">
             <a:extLst>
               <a:ext uri="{FF2B5EF4-FFF2-40B4-BE49-F238E27FC236}">
-                <a16:creationId xmlns:a16="http://schemas.microsoft.com/office/drawing/2014/main" id="{7B81C56C-91F6-45A2-A33F-60E4081BBE1B}"/>
+                <a16:creationId xmlns:a16="http://schemas.microsoft.com/office/drawing/2014/main" id="{3D6EC654-B442-481D-8862-069FF1FB348A}"/>
               </a:ext>
             </a:extLst>
           </p:cNvPr>
           <p:cNvPicPr>
-            <a:picLocks noGrp="1" noChangeAspect="1"/>
+            <a:picLocks noChangeAspect="1"/>
           </p:cNvPicPr>
-          <p:nvPr>
-            <p:ph idx="1"/>
-          </p:nvPr>
+          <p:nvPr/>
         </p:nvPicPr>
         <p:blipFill>
           <a:blip r:embed="rId2"/>
@@ -6725,8 +6724,8 @@
         </p:blipFill>
         <p:spPr>
           <a:xfrm>
-            <a:off x="1677872" y="4412777"/>
-            <a:ext cx="8836256" cy="1057433"/>
+            <a:off x="1477962" y="4221274"/>
+            <a:ext cx="9236076" cy="839644"/>
           </a:xfrm>
           <a:prstGeom prst="rect">
             <a:avLst/>

</xml_diff>